<commit_message>
Added frog photoshop, edited OPP
</commit_message>
<xml_diff>
--- a/AIE Year 2/07 Online Professional Portfolio/William_OPP.pptx
+++ b/AIE Year 2/07 Online Professional Portfolio/William_OPP.pptx
@@ -251,7 +251,7 @@
           <a:p>
             <a:fld id="{C4526828-6423-4FA1-A943-320C0D7BF1F6}" type="datetimeFigureOut">
               <a:rPr lang="en-AU" smtClean="0"/>
-              <a:t>2/12/2021</a:t>
+              <a:t>3/12/2021</a:t>
             </a:fld>
             <a:endParaRPr lang="en-AU"/>
           </a:p>
@@ -421,7 +421,7 @@
           <a:p>
             <a:fld id="{C4526828-6423-4FA1-A943-320C0D7BF1F6}" type="datetimeFigureOut">
               <a:rPr lang="en-AU" smtClean="0"/>
-              <a:t>2/12/2021</a:t>
+              <a:t>3/12/2021</a:t>
             </a:fld>
             <a:endParaRPr lang="en-AU"/>
           </a:p>
@@ -601,7 +601,7 @@
           <a:p>
             <a:fld id="{C4526828-6423-4FA1-A943-320C0D7BF1F6}" type="datetimeFigureOut">
               <a:rPr lang="en-AU" smtClean="0"/>
-              <a:t>2/12/2021</a:t>
+              <a:t>3/12/2021</a:t>
             </a:fld>
             <a:endParaRPr lang="en-AU"/>
           </a:p>
@@ -771,7 +771,7 @@
           <a:p>
             <a:fld id="{C4526828-6423-4FA1-A943-320C0D7BF1F6}" type="datetimeFigureOut">
               <a:rPr lang="en-AU" smtClean="0"/>
-              <a:t>2/12/2021</a:t>
+              <a:t>3/12/2021</a:t>
             </a:fld>
             <a:endParaRPr lang="en-AU"/>
           </a:p>
@@ -1017,7 +1017,7 @@
           <a:p>
             <a:fld id="{C4526828-6423-4FA1-A943-320C0D7BF1F6}" type="datetimeFigureOut">
               <a:rPr lang="en-AU" smtClean="0"/>
-              <a:t>2/12/2021</a:t>
+              <a:t>3/12/2021</a:t>
             </a:fld>
             <a:endParaRPr lang="en-AU"/>
           </a:p>
@@ -1249,7 +1249,7 @@
           <a:p>
             <a:fld id="{C4526828-6423-4FA1-A943-320C0D7BF1F6}" type="datetimeFigureOut">
               <a:rPr lang="en-AU" smtClean="0"/>
-              <a:t>2/12/2021</a:t>
+              <a:t>3/12/2021</a:t>
             </a:fld>
             <a:endParaRPr lang="en-AU"/>
           </a:p>
@@ -1616,7 +1616,7 @@
           <a:p>
             <a:fld id="{C4526828-6423-4FA1-A943-320C0D7BF1F6}" type="datetimeFigureOut">
               <a:rPr lang="en-AU" smtClean="0"/>
-              <a:t>2/12/2021</a:t>
+              <a:t>3/12/2021</a:t>
             </a:fld>
             <a:endParaRPr lang="en-AU"/>
           </a:p>
@@ -1734,7 +1734,7 @@
           <a:p>
             <a:fld id="{C4526828-6423-4FA1-A943-320C0D7BF1F6}" type="datetimeFigureOut">
               <a:rPr lang="en-AU" smtClean="0"/>
-              <a:t>2/12/2021</a:t>
+              <a:t>3/12/2021</a:t>
             </a:fld>
             <a:endParaRPr lang="en-AU"/>
           </a:p>
@@ -1829,7 +1829,7 @@
           <a:p>
             <a:fld id="{C4526828-6423-4FA1-A943-320C0D7BF1F6}" type="datetimeFigureOut">
               <a:rPr lang="en-AU" smtClean="0"/>
-              <a:t>2/12/2021</a:t>
+              <a:t>3/12/2021</a:t>
             </a:fld>
             <a:endParaRPr lang="en-AU"/>
           </a:p>
@@ -2106,7 +2106,7 @@
           <a:p>
             <a:fld id="{C4526828-6423-4FA1-A943-320C0D7BF1F6}" type="datetimeFigureOut">
               <a:rPr lang="en-AU" smtClean="0"/>
-              <a:t>2/12/2021</a:t>
+              <a:t>3/12/2021</a:t>
             </a:fld>
             <a:endParaRPr lang="en-AU"/>
           </a:p>
@@ -2363,7 +2363,7 @@
           <a:p>
             <a:fld id="{C4526828-6423-4FA1-A943-320C0D7BF1F6}" type="datetimeFigureOut">
               <a:rPr lang="en-AU" smtClean="0"/>
-              <a:t>2/12/2021</a:t>
+              <a:t>3/12/2021</a:t>
             </a:fld>
             <a:endParaRPr lang="en-AU"/>
           </a:p>
@@ -2576,7 +2576,7 @@
           <a:p>
             <a:fld id="{C4526828-6423-4FA1-A943-320C0D7BF1F6}" type="datetimeFigureOut">
               <a:rPr lang="en-AU" smtClean="0"/>
-              <a:t>2/12/2021</a:t>
+              <a:t>3/12/2021</a:t>
             </a:fld>
             <a:endParaRPr lang="en-AU"/>
           </a:p>
@@ -3812,14 +3812,14 @@
           <p:nvPr>
             <p:extLst>
               <p:ext uri="{D42A27DB-BD31-4B8C-83A1-F6EECF244321}">
-                <p14:modId xmlns:p14="http://schemas.microsoft.com/office/powerpoint/2010/main" val="128067713"/>
+                <p14:modId xmlns:p14="http://schemas.microsoft.com/office/powerpoint/2010/main" val="3762077925"/>
               </p:ext>
             </p:extLst>
           </p:nvPr>
         </p:nvGraphicFramePr>
         <p:xfrm>
-          <a:off x="1485616" y="2470196"/>
-          <a:ext cx="14638905" cy="3352800"/>
+          <a:off x="2970293" y="2442106"/>
+          <a:ext cx="11669552" cy="3352800"/>
         </p:xfrm>
         <a:graphic>
           <a:graphicData uri="http://schemas.openxmlformats.org/drawingml/2006/table">
@@ -3835,17 +3835,10 @@
                     </a:ext>
                   </a:extLst>
                 </a:gridCol>
-                <a:gridCol w="6327648">
+                <a:gridCol w="10131552">
                   <a:extLst>
                     <a:ext uri="{9D8B030D-6E8A-4147-A177-3AD203B41FA5}">
                       <a16:colId xmlns:a16="http://schemas.microsoft.com/office/drawing/2014/main" val="3999458456"/>
-                    </a:ext>
-                  </a:extLst>
-                </a:gridCol>
-                <a:gridCol w="6773257">
-                  <a:extLst>
-                    <a:ext uri="{9D8B030D-6E8A-4147-A177-3AD203B41FA5}">
-                      <a16:colId xmlns:a16="http://schemas.microsoft.com/office/drawing/2014/main" val="3934142592"/>
                     </a:ext>
                   </a:extLst>
                 </a:gridCol>
@@ -3878,22 +3871,6 @@
                           <a:latin typeface="Tw Cen MT Condensed" panose="020B0606020104020203" pitchFamily="34" charset="0"/>
                         </a:rPr>
                         <a:t>Feedback</a:t>
-                      </a:r>
-                    </a:p>
-                  </a:txBody>
-                  <a:tcPr anchor="ctr"/>
-                </a:tc>
-                <a:tc>
-                  <a:txBody>
-                    <a:bodyPr/>
-                    <a:lstStyle/>
-                    <a:p>
-                      <a:pPr algn="ctr"/>
-                      <a:r>
-                        <a:rPr lang="en-AU" sz="2000" b="1" dirty="0">
-                          <a:latin typeface="Tw Cen MT Condensed" panose="020B0606020104020203" pitchFamily="34" charset="0"/>
-                        </a:rPr>
-                        <a:t>Response</a:t>
                       </a:r>
                     </a:p>
                   </a:txBody>
@@ -3936,21 +3913,6 @@
                   </a:txBody>
                   <a:tcPr/>
                 </a:tc>
-                <a:tc>
-                  <a:txBody>
-                    <a:bodyPr/>
-                    <a:lstStyle/>
-                    <a:p>
-                      <a:r>
-                        <a:rPr lang="en-AU" sz="2000" dirty="0">
-                          <a:latin typeface="Tw Cen MT Condensed" panose="020B0606020104020203" pitchFamily="34" charset="0"/>
-                        </a:rPr>
-                        <a:t>Added an overview segment at the top of each project</a:t>
-                      </a:r>
-                    </a:p>
-                  </a:txBody>
-                  <a:tcPr/>
-                </a:tc>
                 <a:extLst>
                   <a:ext uri="{0D108BD9-81ED-4DB2-BD59-A6C34878D82A}">
                     <a16:rowId xmlns:a16="http://schemas.microsoft.com/office/drawing/2014/main" val="3664732587"/>
@@ -3963,9 +3925,12 @@
                     <a:bodyPr/>
                     <a:lstStyle/>
                     <a:p>
-                      <a:endParaRPr lang="en-AU" sz="2000" dirty="0">
-                        <a:latin typeface="Tw Cen MT Condensed" panose="020B0606020104020203" pitchFamily="34" charset="0"/>
-                      </a:endParaRPr>
+                      <a:r>
+                        <a:rPr lang="en-AU" sz="2000" dirty="0">
+                          <a:latin typeface="Tw Cen MT Condensed" panose="020B0606020104020203" pitchFamily="34" charset="0"/>
+                        </a:rPr>
+                        <a:t>O’Neil</a:t>
+                      </a:r>
                     </a:p>
                   </a:txBody>
                   <a:tcPr/>
@@ -3975,21 +3940,24 @@
                     <a:bodyPr/>
                     <a:lstStyle/>
                     <a:p>
-                      <a:endParaRPr lang="en-AU" sz="2000" dirty="0">
-                        <a:latin typeface="Tw Cen MT Condensed" panose="020B0606020104020203" pitchFamily="34" charset="0"/>
-                      </a:endParaRPr>
-                    </a:p>
-                  </a:txBody>
-                  <a:tcPr/>
-                </a:tc>
-                <a:tc>
-                  <a:txBody>
-                    <a:bodyPr/>
-                    <a:lstStyle/>
-                    <a:p>
-                      <a:endParaRPr lang="en-AU" sz="2000">
-                        <a:latin typeface="Tw Cen MT Condensed" panose="020B0606020104020203" pitchFamily="34" charset="0"/>
-                      </a:endParaRPr>
+                      <a:r>
+                        <a:rPr lang="en-AU" sz="2000" dirty="0">
+                          <a:latin typeface="Tw Cen MT Condensed" panose="020B0606020104020203" pitchFamily="34" charset="0"/>
+                        </a:rPr>
+                        <a:t>Include what kind of designer I </a:t>
+                      </a:r>
+                      <a:r>
+                        <a:rPr lang="en-AU" sz="2000" dirty="0" err="1">
+                          <a:latin typeface="Tw Cen MT Condensed" panose="020B0606020104020203" pitchFamily="34" charset="0"/>
+                        </a:rPr>
+                        <a:t>wanna</a:t>
+                      </a:r>
+                      <a:r>
+                        <a:rPr lang="en-AU" sz="2000" dirty="0">
+                          <a:latin typeface="Tw Cen MT Condensed" panose="020B0606020104020203" pitchFamily="34" charset="0"/>
+                        </a:rPr>
+                        <a:t> be in intro &amp; merge home/about pages</a:t>
+                      </a:r>
                     </a:p>
                   </a:txBody>
                   <a:tcPr/>
@@ -4006,9 +3974,12 @@
                     <a:bodyPr/>
                     <a:lstStyle/>
                     <a:p>
-                      <a:endParaRPr lang="en-AU" sz="2000" dirty="0">
-                        <a:latin typeface="Tw Cen MT Condensed" panose="020B0606020104020203" pitchFamily="34" charset="0"/>
-                      </a:endParaRPr>
+                      <a:r>
+                        <a:rPr lang="en-AU" sz="2000" dirty="0">
+                          <a:latin typeface="Tw Cen MT Condensed" panose="020B0606020104020203" pitchFamily="34" charset="0"/>
+                        </a:rPr>
+                        <a:t>Sebastian</a:t>
+                      </a:r>
                     </a:p>
                   </a:txBody>
                   <a:tcPr/>
@@ -4018,21 +3989,12 @@
                     <a:bodyPr/>
                     <a:lstStyle/>
                     <a:p>
-                      <a:endParaRPr lang="en-AU" sz="2000" dirty="0">
-                        <a:latin typeface="Tw Cen MT Condensed" panose="020B0606020104020203" pitchFamily="34" charset="0"/>
-                      </a:endParaRPr>
-                    </a:p>
-                  </a:txBody>
-                  <a:tcPr/>
-                </a:tc>
-                <a:tc>
-                  <a:txBody>
-                    <a:bodyPr/>
-                    <a:lstStyle/>
-                    <a:p>
-                      <a:endParaRPr lang="en-AU" sz="2000">
-                        <a:latin typeface="Tw Cen MT Condensed" panose="020B0606020104020203" pitchFamily="34" charset="0"/>
-                      </a:endParaRPr>
+                      <a:r>
+                        <a:rPr lang="en-AU" sz="2000" dirty="0">
+                          <a:latin typeface="Tw Cen MT Condensed" panose="020B0606020104020203" pitchFamily="34" charset="0"/>
+                        </a:rPr>
+                        <a:t>Instead of just saying what went wrong in a project, say how I now proceed</a:t>
+                      </a:r>
                     </a:p>
                   </a:txBody>
                   <a:tcPr/>
@@ -4049,9 +4011,12 @@
                     <a:bodyPr/>
                     <a:lstStyle/>
                     <a:p>
-                      <a:endParaRPr lang="en-AU" sz="2000">
-                        <a:latin typeface="Tw Cen MT Condensed" panose="020B0606020104020203" pitchFamily="34" charset="0"/>
-                      </a:endParaRPr>
+                      <a:r>
+                        <a:rPr lang="en-AU" sz="2000" dirty="0">
+                          <a:latin typeface="Tw Cen MT Condensed" panose="020B0606020104020203" pitchFamily="34" charset="0"/>
+                        </a:rPr>
+                        <a:t>Myles</a:t>
+                      </a:r>
                     </a:p>
                   </a:txBody>
                   <a:tcPr/>
@@ -4061,21 +4026,12 @@
                     <a:bodyPr/>
                     <a:lstStyle/>
                     <a:p>
-                      <a:endParaRPr lang="en-AU" sz="2000">
-                        <a:latin typeface="Tw Cen MT Condensed" panose="020B0606020104020203" pitchFamily="34" charset="0"/>
-                      </a:endParaRPr>
-                    </a:p>
-                  </a:txBody>
-                  <a:tcPr/>
-                </a:tc>
-                <a:tc>
-                  <a:txBody>
-                    <a:bodyPr/>
-                    <a:lstStyle/>
-                    <a:p>
-                      <a:endParaRPr lang="en-AU" sz="2000">
-                        <a:latin typeface="Tw Cen MT Condensed" panose="020B0606020104020203" pitchFamily="34" charset="0"/>
-                      </a:endParaRPr>
+                      <a:r>
+                        <a:rPr lang="en-AU" sz="2000" dirty="0">
+                          <a:latin typeface="Tw Cen MT Condensed" panose="020B0606020104020203" pitchFamily="34" charset="0"/>
+                        </a:rPr>
+                        <a:t>Include your process in another page with wireframes, GDDs, testing sheets, etc</a:t>
+                      </a:r>
                     </a:p>
                   </a:txBody>
                   <a:tcPr/>
@@ -4105,18 +4061,6 @@
                     <a:lstStyle/>
                     <a:p>
                       <a:endParaRPr lang="en-AU" sz="2000" dirty="0">
-                        <a:latin typeface="Tw Cen MT Condensed" panose="020B0606020104020203" pitchFamily="34" charset="0"/>
-                      </a:endParaRPr>
-                    </a:p>
-                  </a:txBody>
-                  <a:tcPr/>
-                </a:tc>
-                <a:tc>
-                  <a:txBody>
-                    <a:bodyPr/>
-                    <a:lstStyle/>
-                    <a:p>
-                      <a:endParaRPr lang="en-AU" sz="2000">
                         <a:latin typeface="Tw Cen MT Condensed" panose="020B0606020104020203" pitchFamily="34" charset="0"/>
                       </a:endParaRPr>
                     </a:p>
@@ -4154,18 +4098,6 @@
                   </a:txBody>
                   <a:tcPr/>
                 </a:tc>
-                <a:tc>
-                  <a:txBody>
-                    <a:bodyPr/>
-                    <a:lstStyle/>
-                    <a:p>
-                      <a:endParaRPr lang="en-AU" sz="2000">
-                        <a:latin typeface="Tw Cen MT Condensed" panose="020B0606020104020203" pitchFamily="34" charset="0"/>
-                      </a:endParaRPr>
-                    </a:p>
-                  </a:txBody>
-                  <a:tcPr/>
-                </a:tc>
                 <a:extLst>
                   <a:ext uri="{0D108BD9-81ED-4DB2-BD59-A6C34878D82A}">
                     <a16:rowId xmlns:a16="http://schemas.microsoft.com/office/drawing/2014/main" val="2136430774"/>
@@ -4173,18 +4105,6 @@
                 </a:extLst>
               </a:tr>
               <a:tr h="406042">
-                <a:tc>
-                  <a:txBody>
-                    <a:bodyPr/>
-                    <a:lstStyle/>
-                    <a:p>
-                      <a:endParaRPr lang="en-AU" sz="2000" dirty="0">
-                        <a:latin typeface="Tw Cen MT Condensed" panose="020B0606020104020203" pitchFamily="34" charset="0"/>
-                      </a:endParaRPr>
-                    </a:p>
-                  </a:txBody>
-                  <a:tcPr/>
-                </a:tc>
                 <a:tc>
                   <a:txBody>
                     <a:bodyPr/>

</xml_diff>